<commit_message>
Final Week 4 Update Prezi
</commit_message>
<xml_diff>
--- a/Presentation/Week 4 Prezi.pptx
+++ b/Presentation/Week 4 Prezi.pptx
@@ -26672,7 +26672,7 @@
         <p:spPr>
           <a:xfrm>
             <a:off x="1305981" y="1063690"/>
-            <a:ext cx="9580037" cy="5545454"/>
+            <a:ext cx="9396231" cy="5630142"/>
           </a:xfrm>
           <a:prstGeom prst="rect">
             <a:avLst/>
@@ -26713,6 +26713,48 @@
               </a:rPr>
               <a:t>16</a:t>
             </a:r>
+          </a:p>
+        </p:txBody>
+      </p:sp>
+      <p:sp>
+        <p:nvSpPr>
+          <p:cNvPr id="2" name="TextBox 1">
+            <a:extLst>
+              <a:ext uri="{FF2B5EF4-FFF2-40B4-BE49-F238E27FC236}">
+                <a16:creationId xmlns:a16="http://schemas.microsoft.com/office/drawing/2014/main" id="{C7420216-9CF3-3EDE-74E2-80F9D33476D5}"/>
+              </a:ext>
+            </a:extLst>
+          </p:cNvPr>
+          <p:cNvSpPr txBox="1"/>
+          <p:nvPr/>
+        </p:nvSpPr>
+        <p:spPr>
+          <a:xfrm>
+            <a:off x="0" y="6386055"/>
+            <a:ext cx="3480318" cy="307777"/>
+          </a:xfrm>
+          <a:prstGeom prst="rect">
+            <a:avLst/>
+          </a:prstGeom>
+          <a:noFill/>
+        </p:spPr>
+        <p:txBody>
+          <a:bodyPr wrap="square" rtlCol="0">
+            <a:spAutoFit/>
+          </a:bodyPr>
+          <a:lstStyle/>
+          <a:p>
+            <a:r>
+              <a:rPr lang="en-US" sz="1400" b="1" dirty="0">
+                <a:latin typeface="Arial" panose="020B0604020202020204" pitchFamily="34" charset="0"/>
+                <a:cs typeface="Arial" panose="020B0604020202020204" pitchFamily="34" charset="0"/>
+              </a:rPr>
+              <a:t>Pearson correlation coefficient = 0.91</a:t>
+            </a:r>
+            <a:endParaRPr lang="LID4096" sz="1400" b="1" dirty="0">
+              <a:latin typeface="Arial" panose="020B0604020202020204" pitchFamily="34" charset="0"/>
+              <a:cs typeface="Arial" panose="020B0604020202020204" pitchFamily="34" charset="0"/>
+            </a:endParaRPr>
           </a:p>
         </p:txBody>
       </p:sp>
@@ -35578,21 +35620,21 @@
 </file>
 
 <file path=customXml/item1.xml><?xml version="1.0" encoding="utf-8"?>
+<?mso-contentType ?>
+<FormTemplates xmlns="http://schemas.microsoft.com/sharepoint/v3/contenttype/forms">
+  <Display>DocumentLibraryForm</Display>
+  <Edit>DocumentLibraryForm</Edit>
+  <New>DocumentLibraryForm</New>
+</FormTemplates>
+</file>
+
+<file path=customXml/item2.xml><?xml version="1.0" encoding="utf-8"?>
 <p:properties xmlns:p="http://schemas.microsoft.com/office/2006/metadata/properties" xmlns:xsi="http://www.w3.org/2001/XMLSchema-instance" xmlns:pc="http://schemas.microsoft.com/office/infopath/2007/PartnerControls">
   <documentManagement>
     <Status xmlns="71af3243-3dd4-4a8d-8c0d-dd76da1f02a5">Not started</Status>
     <MediaServiceKeyPoints xmlns="71af3243-3dd4-4a8d-8c0d-dd76da1f02a5" xsi:nil="true"/>
   </documentManagement>
 </p:properties>
-</file>
-
-<file path=customXml/item2.xml><?xml version="1.0" encoding="utf-8"?>
-<?mso-contentType ?>
-<FormTemplates xmlns="http://schemas.microsoft.com/sharepoint/v3/contenttype/forms">
-  <Display>DocumentLibraryForm</Display>
-  <Edit>DocumentLibraryForm</Edit>
-  <New>DocumentLibraryForm</New>
-</FormTemplates>
 </file>
 
 <file path=customXml/item3.xml><?xml version="1.0" encoding="utf-8"?>
@@ -35817,19 +35859,19 @@
 </file>
 
 <file path=customXml/itemProps1.xml><?xml version="1.0" encoding="utf-8"?>
+<ds:datastoreItem xmlns:ds="http://schemas.openxmlformats.org/officeDocument/2006/customXml" ds:itemID="{CF017D31-E675-491F-B600-F06278E25DAD}">
+  <ds:schemaRefs>
+    <ds:schemaRef ds:uri="http://schemas.microsoft.com/sharepoint/v3/contenttype/forms"/>
+  </ds:schemaRefs>
+</ds:datastoreItem>
+</file>
+
+<file path=customXml/itemProps2.xml><?xml version="1.0" encoding="utf-8"?>
 <ds:datastoreItem xmlns:ds="http://schemas.openxmlformats.org/officeDocument/2006/customXml" ds:itemID="{311B8520-39D0-4E39-88E2-3CE8E9A6E44A}">
   <ds:schemaRefs>
     <ds:schemaRef ds:uri="http://schemas.microsoft.com/office/2006/metadata/properties"/>
     <ds:schemaRef ds:uri="http://schemas.microsoft.com/office/infopath/2007/PartnerControls"/>
     <ds:schemaRef ds:uri="71af3243-3dd4-4a8d-8c0d-dd76da1f02a5"/>
-  </ds:schemaRefs>
-</ds:datastoreItem>
-</file>
-
-<file path=customXml/itemProps2.xml><?xml version="1.0" encoding="utf-8"?>
-<ds:datastoreItem xmlns:ds="http://schemas.openxmlformats.org/officeDocument/2006/customXml" ds:itemID="{CF017D31-E675-491F-B600-F06278E25DAD}">
-  <ds:schemaRefs>
-    <ds:schemaRef ds:uri="http://schemas.microsoft.com/sharepoint/v3/contenttype/forms"/>
   </ds:schemaRefs>
 </ds:datastoreItem>
 </file>

</xml_diff>